<commit_message>
Renamed files so that there is ordering
</commit_message>
<xml_diff>
--- a/Intro to ML.pptx
+++ b/Intro to ML.pptx
@@ -371,7 +371,7 @@
           <a:p>
             <a:fld id="{9184DA70-C731-4C70-880D-CCD4705E623C}" type="datetime1">
               <a:rPr lang="en-US" smtClean="0"/>
-              <a:t>1/5/2025</a:t>
+              <a:t>1/14/2025</a:t>
             </a:fld>
             <a:endParaRPr lang="en-US" dirty="0"/>
           </a:p>
@@ -559,7 +559,7 @@
           <a:p>
             <a:fld id="{B612A279-0833-481D-8C56-F67FD0AC6C50}" type="datetime1">
               <a:rPr lang="en-US" smtClean="0"/>
-              <a:t>1/5/2025</a:t>
+              <a:t>1/14/2025</a:t>
             </a:fld>
             <a:endParaRPr lang="en-US" dirty="0"/>
           </a:p>
@@ -801,7 +801,7 @@
           <a:p>
             <a:fld id="{6587DA83-5663-4C9C-B9AA-0B40A3DAFF81}" type="datetime1">
               <a:rPr lang="en-US" smtClean="0"/>
-              <a:t>1/5/2025</a:t>
+              <a:t>1/14/2025</a:t>
             </a:fld>
             <a:endParaRPr lang="en-US" dirty="0"/>
           </a:p>
@@ -989,7 +989,7 @@
           <a:p>
             <a:fld id="{4BE1D723-8F53-4F53-90B0-1982A396982E}" type="datetime1">
               <a:rPr lang="en-US" smtClean="0"/>
-              <a:t>1/5/2025</a:t>
+              <a:t>1/14/2025</a:t>
             </a:fld>
             <a:endParaRPr lang="en-US" dirty="0"/>
           </a:p>
@@ -1362,7 +1362,7 @@
           <a:p>
             <a:fld id="{97669AF7-7BEB-44E4-9852-375E34362B5B}" type="datetime1">
               <a:rPr lang="en-US" smtClean="0"/>
-              <a:t>1/5/2025</a:t>
+              <a:t>1/14/2025</a:t>
             </a:fld>
             <a:endParaRPr lang="en-US" dirty="0"/>
           </a:p>
@@ -1617,7 +1617,7 @@
           <a:p>
             <a:fld id="{BAAAC38D-0552-4C82-B593-E6124DFADBE2}" type="datetime1">
               <a:rPr lang="en-US" smtClean="0"/>
-              <a:t>1/5/2025</a:t>
+              <a:t>1/14/2025</a:t>
             </a:fld>
             <a:endParaRPr lang="en-US" dirty="0"/>
           </a:p>
@@ -2014,7 +2014,7 @@
           <a:p>
             <a:fld id="{D9DF0F1C-5577-4ACB-BB62-DF8F3C494C7E}" type="datetime1">
               <a:rPr lang="en-US" smtClean="0"/>
-              <a:t>1/5/2025</a:t>
+              <a:t>1/14/2025</a:t>
             </a:fld>
             <a:endParaRPr lang="en-US" dirty="0"/>
           </a:p>
@@ -2150,7 +2150,7 @@
           <a:p>
             <a:fld id="{1775B394-D9F9-4F0C-B15D-605F45CB9E9F}" type="datetime1">
               <a:rPr lang="en-US" smtClean="0"/>
-              <a:t>1/5/2025</a:t>
+              <a:t>1/14/2025</a:t>
             </a:fld>
             <a:endParaRPr lang="en-US" dirty="0"/>
           </a:p>
@@ -2307,7 +2307,7 @@
           <a:p>
             <a:fld id="{39667345-2558-425A-8533-9BFDBCE15005}" type="datetime1">
               <a:rPr lang="en-US" smtClean="0"/>
-              <a:t>1/5/2025</a:t>
+              <a:t>1/14/2025</a:t>
             </a:fld>
             <a:endParaRPr lang="en-US" dirty="0"/>
           </a:p>
@@ -2636,7 +2636,7 @@
           <a:p>
             <a:fld id="{92BEA474-078D-4E9B-9B14-09A87B19DC46}" type="datetime1">
               <a:rPr lang="en-US" smtClean="0"/>
-              <a:t>1/5/2025</a:t>
+              <a:t>1/14/2025</a:t>
             </a:fld>
             <a:endParaRPr lang="en-US" dirty="0"/>
           </a:p>
@@ -2986,7 +2986,7 @@
           <a:p>
             <a:fld id="{4907D986-8816-4272-A432-0437A28A9828}" type="datetime1">
               <a:rPr lang="en-US" smtClean="0"/>
-              <a:t>1/5/2025</a:t>
+              <a:t>1/14/2025</a:t>
             </a:fld>
             <a:endParaRPr lang="en-US" dirty="0"/>
           </a:p>
@@ -3247,7 +3247,7 @@
           <a:p>
             <a:fld id="{62D6E202-B606-4609-B914-27C9371A1F6D}" type="datetime1">
               <a:rPr lang="en-US" smtClean="0"/>
-              <a:t>1/5/2025</a:t>
+              <a:t>1/14/2025</a:t>
             </a:fld>
             <a:endParaRPr lang="en-US" dirty="0"/>
           </a:p>
@@ -5212,7 +5212,7 @@
           <a:p>
             <a:r>
               <a:rPr lang="en-US" dirty="0"/>
-              <a:t>Linear models (perceptron, SVM, linear regression &amp; logistic regression)</a:t>
+              <a:t>Linear models (SVM, linear regression &amp; logistic regression)</a:t>
             </a:r>
           </a:p>
           <a:p>
@@ -6311,7 +6311,7 @@
             </a:r>
             <a:r>
               <a:rPr lang="en-US" dirty="0"/>
-              <a:t> is a random error term, which is independent of X and has a zero mean zero</a:t>
+              <a:t> is a random error term, which is independent of X and has a zero mean</a:t>
             </a:r>
           </a:p>
           <a:p>
@@ -6987,6 +6987,15 @@
 </file>
 
 <file path=customXml/item1.xml><?xml version="1.0" encoding="utf-8"?>
+<?mso-contentType ?>
+<FormTemplates xmlns="http://schemas.microsoft.com/sharepoint/v3/contenttype/forms">
+  <Display>DocumentLibraryForm</Display>
+  <Edit>DocumentLibraryForm</Edit>
+  <New>DocumentLibraryForm</New>
+</FormTemplates>
+</file>
+
+<file path=customXml/item2.xml><?xml version="1.0" encoding="utf-8"?>
 <p:properties xmlns:p="http://schemas.microsoft.com/office/2006/metadata/properties" xmlns:xsi="http://www.w3.org/2001/XMLSchema-instance" xmlns:pc="http://schemas.microsoft.com/office/infopath/2007/PartnerControls">
   <documentManagement>
     <_ip_UnifiedCompliancePolicyUIAction xmlns="http://schemas.microsoft.com/sharepoint/v3" xsi:nil="true"/>
@@ -7004,15 +7013,6 @@
     <MediaServiceKeyPoints xmlns="71af3243-3dd4-4a8d-8c0d-dd76da1f02a5" xsi:nil="true"/>
   </documentManagement>
 </p:properties>
-</file>
-
-<file path=customXml/item2.xml><?xml version="1.0" encoding="utf-8"?>
-<?mso-contentType ?>
-<FormTemplates xmlns="http://schemas.microsoft.com/sharepoint/v3/contenttype/forms">
-  <Display>DocumentLibraryForm</Display>
-  <Edit>DocumentLibraryForm</Edit>
-  <New>DocumentLibraryForm</New>
-</FormTemplates>
 </file>
 
 <file path=customXml/item3.xml><?xml version="1.0" encoding="utf-8"?>
@@ -7322,6 +7322,14 @@
 </file>
 
 <file path=customXml/itemProps1.xml><?xml version="1.0" encoding="utf-8"?>
+<ds:datastoreItem xmlns:ds="http://schemas.openxmlformats.org/officeDocument/2006/customXml" ds:itemID="{19DAD249-BF80-48EF-9AFB-36A11BCDC2CE}">
+  <ds:schemaRefs>
+    <ds:schemaRef ds:uri="http://schemas.microsoft.com/sharepoint/v3/contenttype/forms"/>
+  </ds:schemaRefs>
+</ds:datastoreItem>
+</file>
+
+<file path=customXml/itemProps2.xml><?xml version="1.0" encoding="utf-8"?>
 <ds:datastoreItem xmlns:ds="http://schemas.openxmlformats.org/officeDocument/2006/customXml" ds:itemID="{6F4F4D41-822D-40F2-A7AC-E4E6CB36CA7A}">
   <ds:schemaRefs>
     <ds:schemaRef ds:uri="http://schemas.microsoft.com/office/2006/metadata/properties"/>
@@ -7329,14 +7337,6 @@
     <ds:schemaRef ds:uri="http://schemas.microsoft.com/sharepoint/v3"/>
     <ds:schemaRef ds:uri="71af3243-3dd4-4a8d-8c0d-dd76da1f02a5"/>
     <ds:schemaRef ds:uri="230e9df3-be65-4c73-a93b-d1236ebd677e"/>
-  </ds:schemaRefs>
-</ds:datastoreItem>
-</file>
-
-<file path=customXml/itemProps2.xml><?xml version="1.0" encoding="utf-8"?>
-<ds:datastoreItem xmlns:ds="http://schemas.openxmlformats.org/officeDocument/2006/customXml" ds:itemID="{19DAD249-BF80-48EF-9AFB-36A11BCDC2CE}">
-  <ds:schemaRefs>
-    <ds:schemaRef ds:uri="http://schemas.microsoft.com/sharepoint/v3/contenttype/forms"/>
   </ds:schemaRefs>
 </ds:datastoreItem>
 </file>

</xml_diff>

<commit_message>
Added motivation for MSE & Accuracy as a model performance metric
</commit_message>
<xml_diff>
--- a/Intro to ML.pptx
+++ b/Intro to ML.pptx
@@ -19,8 +19,9 @@
     <p:sldId id="283" r:id="rId16"/>
     <p:sldId id="284" r:id="rId17"/>
     <p:sldId id="285" r:id="rId18"/>
-    <p:sldId id="269" r:id="rId19"/>
-    <p:sldId id="258" r:id="rId20"/>
+    <p:sldId id="286" r:id="rId19"/>
+    <p:sldId id="269" r:id="rId20"/>
+    <p:sldId id="258" r:id="rId21"/>
   </p:sldIdLst>
   <p:sldSz cx="12192000" cy="6858000"/>
   <p:notesSz cx="6858000" cy="9144000"/>
@@ -371,7 +372,7 @@
           <a:p>
             <a:fld id="{9184DA70-C731-4C70-880D-CCD4705E623C}" type="datetime1">
               <a:rPr lang="en-US" smtClean="0"/>
-              <a:t>1/14/2025</a:t>
+              <a:t>1/18/2025</a:t>
             </a:fld>
             <a:endParaRPr lang="en-US" dirty="0"/>
           </a:p>
@@ -559,7 +560,7 @@
           <a:p>
             <a:fld id="{B612A279-0833-481D-8C56-F67FD0AC6C50}" type="datetime1">
               <a:rPr lang="en-US" smtClean="0"/>
-              <a:t>1/14/2025</a:t>
+              <a:t>1/18/2025</a:t>
             </a:fld>
             <a:endParaRPr lang="en-US" dirty="0"/>
           </a:p>
@@ -801,7 +802,7 @@
           <a:p>
             <a:fld id="{6587DA83-5663-4C9C-B9AA-0B40A3DAFF81}" type="datetime1">
               <a:rPr lang="en-US" smtClean="0"/>
-              <a:t>1/14/2025</a:t>
+              <a:t>1/18/2025</a:t>
             </a:fld>
             <a:endParaRPr lang="en-US" dirty="0"/>
           </a:p>
@@ -989,7 +990,7 @@
           <a:p>
             <a:fld id="{4BE1D723-8F53-4F53-90B0-1982A396982E}" type="datetime1">
               <a:rPr lang="en-US" smtClean="0"/>
-              <a:t>1/14/2025</a:t>
+              <a:t>1/18/2025</a:t>
             </a:fld>
             <a:endParaRPr lang="en-US" dirty="0"/>
           </a:p>
@@ -1362,7 +1363,7 @@
           <a:p>
             <a:fld id="{97669AF7-7BEB-44E4-9852-375E34362B5B}" type="datetime1">
               <a:rPr lang="en-US" smtClean="0"/>
-              <a:t>1/14/2025</a:t>
+              <a:t>1/18/2025</a:t>
             </a:fld>
             <a:endParaRPr lang="en-US" dirty="0"/>
           </a:p>
@@ -1617,7 +1618,7 @@
           <a:p>
             <a:fld id="{BAAAC38D-0552-4C82-B593-E6124DFADBE2}" type="datetime1">
               <a:rPr lang="en-US" smtClean="0"/>
-              <a:t>1/14/2025</a:t>
+              <a:t>1/18/2025</a:t>
             </a:fld>
             <a:endParaRPr lang="en-US" dirty="0"/>
           </a:p>
@@ -2014,7 +2015,7 @@
           <a:p>
             <a:fld id="{D9DF0F1C-5577-4ACB-BB62-DF8F3C494C7E}" type="datetime1">
               <a:rPr lang="en-US" smtClean="0"/>
-              <a:t>1/14/2025</a:t>
+              <a:t>1/18/2025</a:t>
             </a:fld>
             <a:endParaRPr lang="en-US" dirty="0"/>
           </a:p>
@@ -2150,7 +2151,7 @@
           <a:p>
             <a:fld id="{1775B394-D9F9-4F0C-B15D-605F45CB9E9F}" type="datetime1">
               <a:rPr lang="en-US" smtClean="0"/>
-              <a:t>1/14/2025</a:t>
+              <a:t>1/18/2025</a:t>
             </a:fld>
             <a:endParaRPr lang="en-US" dirty="0"/>
           </a:p>
@@ -2307,7 +2308,7 @@
           <a:p>
             <a:fld id="{39667345-2558-425A-8533-9BFDBCE15005}" type="datetime1">
               <a:rPr lang="en-US" smtClean="0"/>
-              <a:t>1/14/2025</a:t>
+              <a:t>1/18/2025</a:t>
             </a:fld>
             <a:endParaRPr lang="en-US" dirty="0"/>
           </a:p>
@@ -2636,7 +2637,7 @@
           <a:p>
             <a:fld id="{92BEA474-078D-4E9B-9B14-09A87B19DC46}" type="datetime1">
               <a:rPr lang="en-US" smtClean="0"/>
-              <a:t>1/14/2025</a:t>
+              <a:t>1/18/2025</a:t>
             </a:fld>
             <a:endParaRPr lang="en-US" dirty="0"/>
           </a:p>
@@ -2986,7 +2987,7 @@
           <a:p>
             <a:fld id="{4907D986-8816-4272-A432-0437A28A9828}" type="datetime1">
               <a:rPr lang="en-US" smtClean="0"/>
-              <a:t>1/14/2025</a:t>
+              <a:t>1/18/2025</a:t>
             </a:fld>
             <a:endParaRPr lang="en-US" dirty="0"/>
           </a:p>
@@ -3247,7 +3248,7 @@
           <a:p>
             <a:fld id="{62D6E202-B606-4609-B914-27C9371A1F6D}" type="datetime1">
               <a:rPr lang="en-US" smtClean="0"/>
-              <a:t>1/14/2025</a:t>
+              <a:t>1/18/2025</a:t>
             </a:fld>
             <a:endParaRPr lang="en-US" dirty="0"/>
           </a:p>
@@ -4304,7 +4305,7 @@
         <p:spPr>
           <a:xfrm>
             <a:off x="6546684" y="2532544"/>
-            <a:ext cx="4845299" cy="2635385"/>
+            <a:ext cx="5355266" cy="2912759"/>
           </a:xfrm>
           <a:prstGeom prst="rect">
             <a:avLst/>
@@ -4334,7 +4335,7 @@
         <p:spPr>
           <a:xfrm>
             <a:off x="1097280" y="3429000"/>
-            <a:ext cx="4711942" cy="2552831"/>
+            <a:ext cx="5449404" cy="2952372"/>
           </a:xfrm>
           <a:prstGeom prst="rect">
             <a:avLst/>
@@ -4734,12 +4735,6 @@
           <a:p>
             <a:r>
               <a:rPr lang="en-US" dirty="0"/>
-              <a:t>Bias variance trade-off transfers to classification setting as well with some modification</a:t>
-            </a:r>
-          </a:p>
-          <a:p>
-            <a:r>
-              <a:rPr lang="en-US" dirty="0"/>
               <a:t>Training error rate is the proportion of mistakes that are made</a:t>
             </a:r>
             <a:endParaRPr lang="en-IN" dirty="0"/>
@@ -4767,6 +4762,12 @@
             <a:r>
               <a:rPr lang="en-IN" dirty="0"/>
               <a:t>A good classifier is one for which the test error is smallest</a:t>
+            </a:r>
+          </a:p>
+          <a:p>
+            <a:r>
+              <a:rPr lang="en-US" dirty="0"/>
+              <a:t>Bias variance trade-off transfers to classification setting as well with some modification</a:t>
             </a:r>
           </a:p>
         </p:txBody>
@@ -4793,7 +4794,7 @@
         </p:blipFill>
         <p:spPr>
           <a:xfrm>
-            <a:off x="2511719" y="3076170"/>
+            <a:off x="2511719" y="2511092"/>
             <a:ext cx="1168460" cy="520727"/>
           </a:xfrm>
           <a:prstGeom prst="rect">
@@ -4819,6 +4820,142 @@
   <p:cSld>
     <p:spTree>
       <p:nvGrpSpPr>
+        <p:cNvPr id="1" name="">
+          <a:extLst>
+            <a:ext uri="{FF2B5EF4-FFF2-40B4-BE49-F238E27FC236}">
+              <a16:creationId xmlns:a16="http://schemas.microsoft.com/office/drawing/2014/main" id="{938A2524-8FC9-0A30-B25F-EE52138BFDDA}"/>
+            </a:ext>
+          </a:extLst>
+        </p:cNvPr>
+        <p:cNvGrpSpPr/>
+        <p:nvPr/>
+      </p:nvGrpSpPr>
+      <p:grpSpPr>
+        <a:xfrm>
+          <a:off x="0" y="0"/>
+          <a:ext cx="0" cy="0"/>
+          <a:chOff x="0" y="0"/>
+          <a:chExt cx="0" cy="0"/>
+        </a:xfrm>
+      </p:grpSpPr>
+      <p:sp>
+        <p:nvSpPr>
+          <p:cNvPr id="2" name="Title 1">
+            <a:extLst>
+              <a:ext uri="{FF2B5EF4-FFF2-40B4-BE49-F238E27FC236}">
+                <a16:creationId xmlns:a16="http://schemas.microsoft.com/office/drawing/2014/main" id="{A2FB5F69-9882-C296-E526-B292ECA6D517}"/>
+              </a:ext>
+            </a:extLst>
+          </p:cNvPr>
+          <p:cNvSpPr>
+            <a:spLocks noGrp="1"/>
+          </p:cNvSpPr>
+          <p:nvPr>
+            <p:ph type="title"/>
+          </p:nvPr>
+        </p:nvSpPr>
+        <p:spPr/>
+        <p:txBody>
+          <a:bodyPr/>
+          <a:lstStyle/>
+          <a:p>
+            <a:r>
+              <a:rPr lang="en-IN" dirty="0"/>
+              <a:t>Knowledge Check</a:t>
+            </a:r>
+          </a:p>
+        </p:txBody>
+      </p:sp>
+      <p:sp>
+        <p:nvSpPr>
+          <p:cNvPr id="3" name="Content Placeholder 2">
+            <a:extLst>
+              <a:ext uri="{FF2B5EF4-FFF2-40B4-BE49-F238E27FC236}">
+                <a16:creationId xmlns:a16="http://schemas.microsoft.com/office/drawing/2014/main" id="{9635523C-2FAD-6598-D751-5020F46857BB}"/>
+              </a:ext>
+            </a:extLst>
+          </p:cNvPr>
+          <p:cNvSpPr>
+            <a:spLocks noGrp="1"/>
+          </p:cNvSpPr>
+          <p:nvPr>
+            <p:ph idx="1"/>
+          </p:nvPr>
+        </p:nvSpPr>
+        <p:spPr/>
+        <p:txBody>
+          <a:bodyPr>
+            <a:normAutofit/>
+          </a:bodyPr>
+          <a:lstStyle/>
+          <a:p>
+            <a:r>
+              <a:rPr lang="en-US" dirty="0"/>
+              <a:t>What is a model?</a:t>
+            </a:r>
+          </a:p>
+          <a:p>
+            <a:r>
+              <a:rPr lang="en-US" dirty="0"/>
+              <a:t>What is supervised learning/unsupervised learning?</a:t>
+            </a:r>
+            <a:endParaRPr lang="en-IN" dirty="0"/>
+          </a:p>
+          <a:p>
+            <a:pPr algn="l"/>
+            <a:r>
+              <a:rPr lang="en-IN" dirty="0"/>
+              <a:t>Difference between classification and regression?</a:t>
+            </a:r>
+          </a:p>
+          <a:p>
+            <a:pPr algn="l"/>
+            <a:r>
+              <a:rPr lang="en-IN" dirty="0"/>
+              <a:t>What is generalization error? Why it is important?</a:t>
+            </a:r>
+          </a:p>
+          <a:p>
+            <a:pPr algn="l"/>
+            <a:r>
+              <a:rPr lang="en-IN" dirty="0"/>
+              <a:t>Why do we need to estimate f (pattern between X and y)?</a:t>
+            </a:r>
+          </a:p>
+          <a:p>
+            <a:pPr algn="l"/>
+            <a:r>
+              <a:rPr lang="en-IN" dirty="0"/>
+              <a:t>What is Bias Variance Trade-off?</a:t>
+            </a:r>
+          </a:p>
+          <a:p>
+            <a:pPr algn="l"/>
+            <a:r>
+              <a:rPr lang="en-IN" dirty="0"/>
+              <a:t>Variance of flexible model? Bias? Accuracy computation?</a:t>
+            </a:r>
+          </a:p>
+        </p:txBody>
+      </p:sp>
+    </p:spTree>
+    <p:extLst>
+      <p:ext uri="{BB962C8B-B14F-4D97-AF65-F5344CB8AC3E}">
+        <p14:creationId xmlns:p14="http://schemas.microsoft.com/office/powerpoint/2010/main" val="3185594953"/>
+      </p:ext>
+    </p:extLst>
+  </p:cSld>
+  <p:clrMapOvr>
+    <a:masterClrMapping/>
+  </p:clrMapOvr>
+</p:sld>
+</file>
+
+<file path=ppt/slides/slide16.xml><?xml version="1.0" encoding="utf-8"?>
+<p:sld xmlns:a="http://schemas.openxmlformats.org/drawingml/2006/main" xmlns:r="http://schemas.openxmlformats.org/officeDocument/2006/relationships" xmlns:p="http://schemas.openxmlformats.org/presentationml/2006/main">
+  <p:cSld>
+    <p:spTree>
+      <p:nvGrpSpPr>
         <p:cNvPr id="1" name=""/>
         <p:cNvGrpSpPr/>
         <p:nvPr/>
@@ -4922,7 +5059,7 @@
 </p:sld>
 </file>
 
-<file path=ppt/slides/slide16.xml><?xml version="1.0" encoding="utf-8"?>
+<file path=ppt/slides/slide17.xml><?xml version="1.0" encoding="utf-8"?>
 <p:sld xmlns:a="http://schemas.openxmlformats.org/drawingml/2006/main" xmlns:r="http://schemas.openxmlformats.org/officeDocument/2006/relationships" xmlns:p="http://schemas.openxmlformats.org/presentationml/2006/main">
   <p:cSld>
     <p:bg>
@@ -5182,7 +5319,7 @@
         <p:spPr/>
         <p:txBody>
           <a:bodyPr>
-            <a:normAutofit fontScale="77500" lnSpcReduction="20000"/>
+            <a:normAutofit fontScale="92500" lnSpcReduction="20000"/>
           </a:bodyPr>
           <a:lstStyle/>
           <a:p>
@@ -5194,77 +5331,50 @@
           <a:p>
             <a:r>
               <a:rPr lang="en-US" dirty="0"/>
-              <a:t>What is a model?</a:t>
+              <a:t>Supervised/unsupervised learning</a:t>
             </a:r>
           </a:p>
           <a:p>
             <a:r>
               <a:rPr lang="en-US" dirty="0"/>
-              <a:t>Supervised/unsupervised learning</a:t>
+              <a:t>Regression vs classification</a:t>
             </a:r>
           </a:p>
           <a:p>
             <a:r>
               <a:rPr lang="en-US" dirty="0"/>
-              <a:t>Regression vs Classification</a:t>
+              <a:t>Linear models (linear regression, logistic regression, naive Bayes &amp; SVM)</a:t>
             </a:r>
           </a:p>
           <a:p>
             <a:r>
               <a:rPr lang="en-US" dirty="0"/>
-              <a:t>Linear models (SVM, linear regression &amp; logistic regression)</a:t>
+              <a:t>Non-linear models (KNN, Decision Trees &amp; Random Forest)</a:t>
             </a:r>
           </a:p>
           <a:p>
             <a:r>
               <a:rPr lang="en-US" dirty="0"/>
-              <a:t>Non-linear models (Decision Trees, Random Forest &amp; Boosting)</a:t>
+              <a:t>Bias variance trade-off (overfitting &amp; underfitting)</a:t>
             </a:r>
           </a:p>
           <a:p>
             <a:r>
               <a:rPr lang="en-US" dirty="0"/>
-              <a:t>Model Selection &amp; Hyper parameter tunning</a:t>
+              <a:t>Resampling techniques</a:t>
             </a:r>
           </a:p>
           <a:p>
             <a:r>
               <a:rPr lang="en-US" dirty="0"/>
-              <a:t>Bias variance (Overfitting &amp; underfitting)</a:t>
+              <a:t>Model selection &amp; hyperparameter tunning</a:t>
             </a:r>
           </a:p>
           <a:p>
             <a:r>
               <a:rPr lang="en-US" dirty="0"/>
-              <a:t>Productionizing  a model (</a:t>
-            </a:r>
-            <a:r>
-              <a:rPr lang="en-US" dirty="0" err="1"/>
-              <a:t>joblib</a:t>
-            </a:r>
-            <a:r>
-              <a:rPr lang="en-US" dirty="0"/>
-              <a:t>, pickle &amp; </a:t>
-            </a:r>
-            <a:r>
-              <a:rPr lang="en-US" dirty="0" err="1"/>
-              <a:t>FastAPI</a:t>
-            </a:r>
-            <a:r>
-              <a:rPr lang="en-US" dirty="0"/>
-              <a:t>)</a:t>
-            </a:r>
-          </a:p>
-          <a:p>
-            <a:r>
-              <a:rPr lang="en-US" dirty="0"/>
-              <a:t>Imbalanced dataset (classes) – oversampling &amp; </a:t>
-            </a:r>
-            <a:r>
-              <a:rPr lang="en-US" dirty="0" err="1"/>
-              <a:t>undersampling</a:t>
-            </a:r>
-            <a:endParaRPr lang="en-US" dirty="0"/>
+              <a:t>Weight lifting exercise dataset – practice problem</a:t>
+            </a:r>
           </a:p>
         </p:txBody>
       </p:sp>
@@ -5430,6 +5540,36 @@
           </a:p>
         </p:txBody>
       </p:sp>
+      <p:pic>
+        <p:nvPicPr>
+          <p:cNvPr id="8" name="Picture 7">
+            <a:extLst>
+              <a:ext uri="{FF2B5EF4-FFF2-40B4-BE49-F238E27FC236}">
+                <a16:creationId xmlns:a16="http://schemas.microsoft.com/office/drawing/2014/main" id="{3C004494-5C3D-06B1-4B3C-139D05ED37DA}"/>
+              </a:ext>
+            </a:extLst>
+          </p:cNvPr>
+          <p:cNvPicPr>
+            <a:picLocks noChangeAspect="1"/>
+          </p:cNvPicPr>
+          <p:nvPr/>
+        </p:nvPicPr>
+        <p:blipFill>
+          <a:blip r:embed="rId2"/>
+          <a:stretch>
+            <a:fillRect/>
+          </a:stretch>
+        </p:blipFill>
+        <p:spPr>
+          <a:xfrm>
+            <a:off x="8133979" y="2930499"/>
+            <a:ext cx="1924149" cy="997001"/>
+          </a:xfrm>
+          <a:prstGeom prst="rect">
+            <a:avLst/>
+          </a:prstGeom>
+        </p:spPr>
+      </p:pic>
     </p:spTree>
     <p:extLst>
       <p:ext uri="{BB962C8B-B14F-4D97-AF65-F5344CB8AC3E}">
@@ -6614,31 +6754,32 @@
           <a:p>
             <a:pPr lvl="1"/>
             <a:r>
+              <a:rPr lang="en-US" b="1"/>
+              <a:t>income</a:t>
+            </a:r>
+            <a:r>
+              <a:rPr lang="en-US"/>
+              <a:t> ≈ β0 + β1 × </a:t>
+            </a:r>
+            <a:r>
+              <a:rPr lang="en-US" b="1"/>
+              <a:t>education</a:t>
+            </a:r>
+            <a:r>
+              <a:rPr lang="en-US"/>
+              <a:t> + β2 × </a:t>
+            </a:r>
+            <a:r>
+              <a:rPr lang="en-US" b="1"/>
+              <a:t>seniority</a:t>
+            </a:r>
+            <a:endParaRPr lang="en-US" dirty="0"/>
+          </a:p>
+          <a:p>
+            <a:pPr lvl="1"/>
+            <a:r>
               <a:rPr lang="en-US" dirty="0"/>
               <a:t>Use the training data to fit or train the model</a:t>
-            </a:r>
-          </a:p>
-          <a:p>
-            <a:pPr lvl="1"/>
-            <a:r>
-              <a:rPr lang="en-US" b="1" dirty="0"/>
-              <a:t>income</a:t>
-            </a:r>
-            <a:r>
-              <a:rPr lang="en-US" dirty="0"/>
-              <a:t> ≈ β0 + β1 × </a:t>
-            </a:r>
-            <a:r>
-              <a:rPr lang="en-US" b="1" dirty="0"/>
-              <a:t>education</a:t>
-            </a:r>
-            <a:r>
-              <a:rPr lang="en-US" dirty="0"/>
-              <a:t> + β2 × </a:t>
-            </a:r>
-            <a:r>
-              <a:rPr lang="en-US" b="1" dirty="0"/>
-              <a:t>seniority</a:t>
             </a:r>
           </a:p>
           <a:p>

</xml_diff>